<commit_message>
changes for evolution conference
</commit_message>
<xml_diff>
--- a/preliminary_mcalifornianus_results/Preliminary_Presentation.pptx
+++ b/preliminary_mcalifornianus_results/Preliminary_Presentation.pptx
@@ -114,6 +114,11 @@
       </a:defRPr>
     </a:lvl9pPr>
   </p:defaultTextStyle>
+  <p:extLst>
+    <p:ext uri="{EFAFB233-063F-42B5-8137-9DF3F51BA10A}">
+      <p15:sldGuideLst xmlns:p15="http://schemas.microsoft.com/office/powerpoint/2012/main"/>
+    </p:ext>
+  </p:extLst>
 </p:presentation>
 </file>
 
@@ -199,7 +204,7 @@
           <a:p>
             <a:fld id="{3BC8103D-CC8C-3E48-AB51-212ADA1D7639}" type="datetimeFigureOut">
               <a:rPr lang="en-US" smtClean="0"/>
-              <a:t>6/3/21</a:t>
+              <a:t>6/4/2021</a:t>
             </a:fld>
             <a:endParaRPr lang="en-US"/>
           </a:p>
@@ -706,7 +711,7 @@
           <a:p>
             <a:fld id="{3AF1F4F7-1B89-6F4D-BE50-004C0E1208F1}" type="datetimeFigureOut">
               <a:rPr lang="en-US" smtClean="0"/>
-              <a:t>6/3/21</a:t>
+              <a:t>6/4/2021</a:t>
             </a:fld>
             <a:endParaRPr lang="en-US"/>
           </a:p>
@@ -904,7 +909,7 @@
           <a:p>
             <a:fld id="{3AF1F4F7-1B89-6F4D-BE50-004C0E1208F1}" type="datetimeFigureOut">
               <a:rPr lang="en-US" smtClean="0"/>
-              <a:t>6/3/21</a:t>
+              <a:t>6/4/2021</a:t>
             </a:fld>
             <a:endParaRPr lang="en-US"/>
           </a:p>
@@ -1112,7 +1117,7 @@
           <a:p>
             <a:fld id="{3AF1F4F7-1B89-6F4D-BE50-004C0E1208F1}" type="datetimeFigureOut">
               <a:rPr lang="en-US" smtClean="0"/>
-              <a:t>6/3/21</a:t>
+              <a:t>6/4/2021</a:t>
             </a:fld>
             <a:endParaRPr lang="en-US"/>
           </a:p>
@@ -1310,7 +1315,7 @@
           <a:p>
             <a:fld id="{3AF1F4F7-1B89-6F4D-BE50-004C0E1208F1}" type="datetimeFigureOut">
               <a:rPr lang="en-US" smtClean="0"/>
-              <a:t>6/3/21</a:t>
+              <a:t>6/4/2021</a:t>
             </a:fld>
             <a:endParaRPr lang="en-US"/>
           </a:p>
@@ -1585,7 +1590,7 @@
           <a:p>
             <a:fld id="{3AF1F4F7-1B89-6F4D-BE50-004C0E1208F1}" type="datetimeFigureOut">
               <a:rPr lang="en-US" smtClean="0"/>
-              <a:t>6/3/21</a:t>
+              <a:t>6/4/2021</a:t>
             </a:fld>
             <a:endParaRPr lang="en-US"/>
           </a:p>
@@ -1850,7 +1855,7 @@
           <a:p>
             <a:fld id="{3AF1F4F7-1B89-6F4D-BE50-004C0E1208F1}" type="datetimeFigureOut">
               <a:rPr lang="en-US" smtClean="0"/>
-              <a:t>6/3/21</a:t>
+              <a:t>6/4/2021</a:t>
             </a:fld>
             <a:endParaRPr lang="en-US"/>
           </a:p>
@@ -2262,7 +2267,7 @@
           <a:p>
             <a:fld id="{3AF1F4F7-1B89-6F4D-BE50-004C0E1208F1}" type="datetimeFigureOut">
               <a:rPr lang="en-US" smtClean="0"/>
-              <a:t>6/3/21</a:t>
+              <a:t>6/4/2021</a:t>
             </a:fld>
             <a:endParaRPr lang="en-US"/>
           </a:p>
@@ -2403,7 +2408,7 @@
           <a:p>
             <a:fld id="{3AF1F4F7-1B89-6F4D-BE50-004C0E1208F1}" type="datetimeFigureOut">
               <a:rPr lang="en-US" smtClean="0"/>
-              <a:t>6/3/21</a:t>
+              <a:t>6/4/2021</a:t>
             </a:fld>
             <a:endParaRPr lang="en-US"/>
           </a:p>
@@ -2516,7 +2521,7 @@
           <a:p>
             <a:fld id="{3AF1F4F7-1B89-6F4D-BE50-004C0E1208F1}" type="datetimeFigureOut">
               <a:rPr lang="en-US" smtClean="0"/>
-              <a:t>6/3/21</a:t>
+              <a:t>6/4/2021</a:t>
             </a:fld>
             <a:endParaRPr lang="en-US"/>
           </a:p>
@@ -2827,7 +2832,7 @@
           <a:p>
             <a:fld id="{3AF1F4F7-1B89-6F4D-BE50-004C0E1208F1}" type="datetimeFigureOut">
               <a:rPr lang="en-US" smtClean="0"/>
-              <a:t>6/3/21</a:t>
+              <a:t>6/4/2021</a:t>
             </a:fld>
             <a:endParaRPr lang="en-US"/>
           </a:p>
@@ -3115,7 +3120,7 @@
           <a:p>
             <a:fld id="{3AF1F4F7-1B89-6F4D-BE50-004C0E1208F1}" type="datetimeFigureOut">
               <a:rPr lang="en-US" smtClean="0"/>
-              <a:t>6/3/21</a:t>
+              <a:t>6/4/2021</a:t>
             </a:fld>
             <a:endParaRPr lang="en-US"/>
           </a:p>
@@ -3356,7 +3361,7 @@
           <a:p>
             <a:fld id="{3AF1F4F7-1B89-6F4D-BE50-004C0E1208F1}" type="datetimeFigureOut">
               <a:rPr lang="en-US" smtClean="0"/>
-              <a:t>6/3/21</a:t>
+              <a:t>6/4/2021</a:t>
             </a:fld>
             <a:endParaRPr lang="en-US"/>
           </a:p>
@@ -6105,7 +6110,7 @@
             <p:ph idx="1"/>
             <p:extLst>
               <p:ext uri="{D42A27DB-BD31-4B8C-83A1-F6EECF244321}">
-                <p14:modId xmlns:p14="http://schemas.microsoft.com/office/powerpoint/2010/main" val="1666860402"/>
+                <p14:modId xmlns:p14="http://schemas.microsoft.com/office/powerpoint/2010/main" val="856523536"/>
               </p:ext>
             </p:extLst>
           </p:nvPr>
@@ -6192,7 +6197,7 @@
                     <a:p>
                       <a:pPr algn="l" fontAlgn="b"/>
                       <a:r>
-                        <a:rPr lang="en-US" sz="1800" b="0" i="0" u="none" strike="noStrike">
+                        <a:rPr lang="en-US" sz="1800" b="0" i="0" u="none" strike="noStrike" dirty="0" err="1">
                           <a:solidFill>
                             <a:srgbClr val="000000"/>
                           </a:solidFill>
@@ -6201,6 +6206,13 @@
                         </a:rPr>
                         <a:t>Marg_Like</a:t>
                       </a:r>
+                      <a:endParaRPr lang="en-US" sz="1800" b="0" i="0" u="none" strike="noStrike" dirty="0">
+                        <a:solidFill>
+                          <a:srgbClr val="000000"/>
+                        </a:solidFill>
+                        <a:effectLst/>
+                        <a:latin typeface="Calibri" panose="020F0502020204030204" pitchFamily="34" charset="0"/>
+                      </a:endParaRPr>
                     </a:p>
                   </a:txBody>
                   <a:tcPr marL="9525" marR="9525" marT="9525" marB="0" anchor="b"/>
@@ -6232,7 +6244,7 @@
                     <a:p>
                       <a:pPr algn="l" fontAlgn="b"/>
                       <a:r>
-                        <a:rPr lang="en-US" sz="1800" b="0" i="0" u="none" strike="noStrike">
+                        <a:rPr lang="en-US" sz="1800" b="0" i="0" u="none" strike="noStrike" dirty="0">
                           <a:solidFill>
                             <a:srgbClr val="000000"/>
                           </a:solidFill>
@@ -6399,7 +6411,7 @@
                     <a:p>
                       <a:pPr algn="r" fontAlgn="b"/>
                       <a:r>
-                        <a:rPr lang="en-US" sz="1800" b="0" i="0" u="none" strike="noStrike">
+                        <a:rPr lang="en-US" sz="1800" b="0" i="0" u="none" strike="noStrike" dirty="0">
                           <a:solidFill>
                             <a:srgbClr val="000000"/>
                           </a:solidFill>
@@ -6526,7 +6538,7 @@
                     <a:p>
                       <a:pPr algn="r" fontAlgn="b"/>
                       <a:r>
-                        <a:rPr lang="en-US" sz="1800" b="0" i="0" u="none" strike="noStrike">
+                        <a:rPr lang="en-US" sz="1800" b="0" i="0" u="none" strike="noStrike" dirty="0">
                           <a:solidFill>
                             <a:srgbClr val="000000"/>
                           </a:solidFill>
@@ -6653,7 +6665,7 @@
                     <a:p>
                       <a:pPr algn="r" fontAlgn="b"/>
                       <a:r>
-                        <a:rPr lang="en-US" sz="1800" b="0" i="0" u="none" strike="noStrike">
+                        <a:rPr lang="en-US" sz="1800" b="0" i="0" u="none" strike="noStrike" dirty="0">
                           <a:solidFill>
                             <a:srgbClr val="000000"/>
                           </a:solidFill>
@@ -6700,7 +6712,7 @@
                     <a:p>
                       <a:pPr algn="r" fontAlgn="b"/>
                       <a:r>
-                        <a:rPr lang="en-US" sz="1800" b="0" i="0" u="none" strike="noStrike">
+                        <a:rPr lang="en-US" sz="1800" b="0" i="0" u="none" strike="noStrike" dirty="0">
                           <a:solidFill>
                             <a:srgbClr val="000000"/>
                           </a:solidFill>
@@ -6720,7 +6732,7 @@
                     <a:p>
                       <a:pPr algn="r" fontAlgn="b"/>
                       <a:r>
-                        <a:rPr lang="en-US" sz="1800" b="0" i="0" u="none" strike="noStrike">
+                        <a:rPr lang="en-US" sz="1800" b="0" i="0" u="none" strike="noStrike" dirty="0">
                           <a:solidFill>
                             <a:srgbClr val="000000"/>
                           </a:solidFill>
@@ -6981,7 +6993,7 @@
                     <a:p>
                       <a:pPr algn="r" fontAlgn="b"/>
                       <a:r>
-                        <a:rPr lang="en-US" sz="1800" b="0" i="0" u="none" strike="noStrike">
+                        <a:rPr lang="en-US" sz="1800" b="0" i="0" u="none" strike="noStrike" dirty="0">
                           <a:solidFill>
                             <a:srgbClr val="000000"/>
                           </a:solidFill>
@@ -7001,7 +7013,7 @@
                     <a:p>
                       <a:pPr algn="r" fontAlgn="b"/>
                       <a:r>
-                        <a:rPr lang="en-US" sz="1800" b="0" i="0" u="none" strike="noStrike">
+                        <a:rPr lang="en-US" sz="1800" b="0" i="0" u="none" strike="noStrike" dirty="0">
                           <a:solidFill>
                             <a:srgbClr val="000000"/>
                           </a:solidFill>

</xml_diff>